<commit_message>
commit tests and outline of presentation
</commit_message>
<xml_diff>
--- a/slides/Presentation.pptx
+++ b/slides/Presentation.pptx
@@ -300,7 +300,7 @@
           <a:p>
             <a:fld id="{8F889238-AECC-914C-9B9C-40867C8528FF}" type="datetimeFigureOut">
               <a:rPr lang="en-US" smtClean="0"/>
-              <a:t>6/26/15</a:t>
+              <a:t>7/6/15</a:t>
             </a:fld>
             <a:endParaRPr lang="en-US"/>
           </a:p>
@@ -470,7 +470,7 @@
           <a:p>
             <a:fld id="{8F889238-AECC-914C-9B9C-40867C8528FF}" type="datetimeFigureOut">
               <a:rPr lang="en-US" smtClean="0"/>
-              <a:t>6/26/15</a:t>
+              <a:t>7/6/15</a:t>
             </a:fld>
             <a:endParaRPr lang="en-US"/>
           </a:p>
@@ -650,7 +650,7 @@
           <a:p>
             <a:fld id="{8F889238-AECC-914C-9B9C-40867C8528FF}" type="datetimeFigureOut">
               <a:rPr lang="en-US" smtClean="0"/>
-              <a:t>6/26/15</a:t>
+              <a:t>7/6/15</a:t>
             </a:fld>
             <a:endParaRPr lang="en-US"/>
           </a:p>
@@ -820,7 +820,7 @@
           <a:p>
             <a:fld id="{8F889238-AECC-914C-9B9C-40867C8528FF}" type="datetimeFigureOut">
               <a:rPr lang="en-US" smtClean="0"/>
-              <a:t>6/26/15</a:t>
+              <a:t>7/6/15</a:t>
             </a:fld>
             <a:endParaRPr lang="en-US"/>
           </a:p>
@@ -1066,7 +1066,7 @@
           <a:p>
             <a:fld id="{8F889238-AECC-914C-9B9C-40867C8528FF}" type="datetimeFigureOut">
               <a:rPr lang="en-US" smtClean="0"/>
-              <a:t>6/26/15</a:t>
+              <a:t>7/6/15</a:t>
             </a:fld>
             <a:endParaRPr lang="en-US"/>
           </a:p>
@@ -1354,7 +1354,7 @@
           <a:p>
             <a:fld id="{8F889238-AECC-914C-9B9C-40867C8528FF}" type="datetimeFigureOut">
               <a:rPr lang="en-US" smtClean="0"/>
-              <a:t>6/26/15</a:t>
+              <a:t>7/6/15</a:t>
             </a:fld>
             <a:endParaRPr lang="en-US"/>
           </a:p>
@@ -1776,7 +1776,7 @@
           <a:p>
             <a:fld id="{8F889238-AECC-914C-9B9C-40867C8528FF}" type="datetimeFigureOut">
               <a:rPr lang="en-US" smtClean="0"/>
-              <a:t>6/26/15</a:t>
+              <a:t>7/6/15</a:t>
             </a:fld>
             <a:endParaRPr lang="en-US"/>
           </a:p>
@@ -1894,7 +1894,7 @@
           <a:p>
             <a:fld id="{8F889238-AECC-914C-9B9C-40867C8528FF}" type="datetimeFigureOut">
               <a:rPr lang="en-US" smtClean="0"/>
-              <a:t>6/26/15</a:t>
+              <a:t>7/6/15</a:t>
             </a:fld>
             <a:endParaRPr lang="en-US"/>
           </a:p>
@@ -1989,7 +1989,7 @@
           <a:p>
             <a:fld id="{8F889238-AECC-914C-9B9C-40867C8528FF}" type="datetimeFigureOut">
               <a:rPr lang="en-US" smtClean="0"/>
-              <a:t>6/26/15</a:t>
+              <a:t>7/6/15</a:t>
             </a:fld>
             <a:endParaRPr lang="en-US"/>
           </a:p>
@@ -2266,7 +2266,7 @@
           <a:p>
             <a:fld id="{8F889238-AECC-914C-9B9C-40867C8528FF}" type="datetimeFigureOut">
               <a:rPr lang="en-US" smtClean="0"/>
-              <a:t>6/26/15</a:t>
+              <a:t>7/6/15</a:t>
             </a:fld>
             <a:endParaRPr lang="en-US"/>
           </a:p>
@@ -2519,7 +2519,7 @@
           <a:p>
             <a:fld id="{8F889238-AECC-914C-9B9C-40867C8528FF}" type="datetimeFigureOut">
               <a:rPr lang="en-US" smtClean="0"/>
-              <a:t>6/26/15</a:t>
+              <a:t>7/6/15</a:t>
             </a:fld>
             <a:endParaRPr lang="en-US"/>
           </a:p>
@@ -2732,7 +2732,7 @@
           <a:p>
             <a:fld id="{8F889238-AECC-914C-9B9C-40867C8528FF}" type="datetimeFigureOut">
               <a:rPr lang="en-US" smtClean="0"/>
-              <a:t>6/26/15</a:t>
+              <a:t>7/6/15</a:t>
             </a:fld>
             <a:endParaRPr lang="en-US"/>
           </a:p>

</xml_diff>